<commit_message>
Added problem question to slides.
</commit_message>
<xml_diff>
--- a/Slides.pptx
+++ b/Slides.pptx
@@ -12,8 +12,8 @@
     <p:sldId id="257" r:id="rId3"/>
     <p:sldId id="258" r:id="rId4"/>
     <p:sldId id="259" r:id="rId5"/>
-    <p:sldId id="260" r:id="rId6"/>
-    <p:sldId id="261" r:id="rId7"/>
+    <p:sldId id="261" r:id="rId6"/>
+    <p:sldId id="260" r:id="rId7"/>
   </p:sldIdLst>
   <p:sldSz cx="12192000" cy="6858000"/>
   <p:notesSz cx="6858000" cy="9144000"/>
@@ -8698,7 +8698,7 @@
           <a:p>
             <a:r>
               <a:rPr lang="en-CA" dirty="0"/>
-              <a:t>Expect the average sentiment of tweets to decrease as daily cases increased.</a:t>
+              <a:t>What is the effect of COVID-19 on tweet sentiment?</a:t>
             </a:r>
           </a:p>
           <a:p>
@@ -10257,277 +10257,6 @@
 <file path=ppt/slides/slide5.xml><?xml version="1.0" encoding="utf-8"?>
 <p:sld xmlns:a="http://schemas.openxmlformats.org/drawingml/2006/main" xmlns:r="http://schemas.openxmlformats.org/officeDocument/2006/relationships" xmlns:p="http://schemas.openxmlformats.org/presentationml/2006/main">
   <p:cSld>
-    <p:spTree>
-      <p:nvGrpSpPr>
-        <p:cNvPr id="1" name=""/>
-        <p:cNvGrpSpPr/>
-        <p:nvPr/>
-      </p:nvGrpSpPr>
-      <p:grpSpPr>
-        <a:xfrm>
-          <a:off x="0" y="0"/>
-          <a:ext cx="0" cy="0"/>
-          <a:chOff x="0" y="0"/>
-          <a:chExt cx="0" cy="0"/>
-        </a:xfrm>
-      </p:grpSpPr>
-      <p:sp>
-        <p:nvSpPr>
-          <p:cNvPr id="2" name="Title 1">
-            <a:extLst>
-              <a:ext uri="{FF2B5EF4-FFF2-40B4-BE49-F238E27FC236}">
-                <a16:creationId xmlns:a16="http://schemas.microsoft.com/office/drawing/2014/main" id="{EFC8D769-35B7-4E82-A5B1-7C2C646912B5}"/>
-              </a:ext>
-            </a:extLst>
-          </p:cNvPr>
-          <p:cNvSpPr>
-            <a:spLocks noGrp="1"/>
-          </p:cNvSpPr>
-          <p:nvPr>
-            <p:ph type="title"/>
-          </p:nvPr>
-        </p:nvSpPr>
-        <p:spPr/>
-        <p:txBody>
-          <a:bodyPr/>
-          <a:lstStyle/>
-          <a:p>
-            <a:r>
-              <a:rPr lang="en-CA" dirty="0"/>
-              <a:t>References</a:t>
-            </a:r>
-          </a:p>
-        </p:txBody>
-      </p:sp>
-      <p:sp>
-        <p:nvSpPr>
-          <p:cNvPr id="3" name="Content Placeholder 2">
-            <a:extLst>
-              <a:ext uri="{FF2B5EF4-FFF2-40B4-BE49-F238E27FC236}">
-                <a16:creationId xmlns:a16="http://schemas.microsoft.com/office/drawing/2014/main" id="{80825841-B114-4D00-BA2F-99DCE12ED734}"/>
-              </a:ext>
-            </a:extLst>
-          </p:cNvPr>
-          <p:cNvSpPr>
-            <a:spLocks noGrp="1"/>
-          </p:cNvSpPr>
-          <p:nvPr>
-            <p:ph idx="1"/>
-          </p:nvPr>
-        </p:nvSpPr>
-        <p:spPr>
-          <a:xfrm>
-            <a:off x="550862" y="1754981"/>
-            <a:ext cx="11336337" cy="4061358"/>
-          </a:xfrm>
-        </p:spPr>
-        <p:txBody>
-          <a:bodyPr>
-            <a:normAutofit fontScale="77500" lnSpcReduction="20000"/>
-          </a:bodyPr>
-          <a:lstStyle/>
-          <a:p>
-            <a:r>
-              <a:rPr lang="en-CA" dirty="0"/>
-              <a:t>[1] Rabindra </a:t>
-            </a:r>
-            <a:r>
-              <a:rPr lang="en-CA" dirty="0" err="1"/>
-              <a:t>Lamsal</a:t>
-            </a:r>
-            <a:r>
-              <a:rPr lang="en-CA" dirty="0"/>
-              <a:t>. "Coronavirus (COVID-19) Tweets Dataset". IEEE </a:t>
-            </a:r>
-            <a:r>
-              <a:rPr lang="en-CA" dirty="0" err="1"/>
-              <a:t>Dataport</a:t>
-            </a:r>
-            <a:r>
-              <a:rPr lang="en-CA" dirty="0"/>
-              <a:t>, 2020. [Online]. Available: </a:t>
-            </a:r>
-            <a:r>
-              <a:rPr lang="en-CA" dirty="0">
-                <a:hlinkClick r:id="rId2"/>
-              </a:rPr>
-              <a:t>http://dx.doi.org/10.21227/781w-ef42</a:t>
-            </a:r>
-            <a:r>
-              <a:rPr lang="en-CA" dirty="0"/>
-              <a:t>. Accessed: Jun. 05, 2020.</a:t>
-            </a:r>
-          </a:p>
-          <a:p>
-            <a:r>
-              <a:rPr lang="en-CA" dirty="0"/>
-              <a:t>[2] Banda, Juan M., </a:t>
-            </a:r>
-            <a:r>
-              <a:rPr lang="en-CA" dirty="0" err="1"/>
-              <a:t>Tekumalla</a:t>
-            </a:r>
-            <a:r>
-              <a:rPr lang="en-CA" dirty="0"/>
-              <a:t>, Ramya, Wang, </a:t>
-            </a:r>
-            <a:r>
-              <a:rPr lang="en-CA" dirty="0" err="1"/>
-              <a:t>Guanyu</a:t>
-            </a:r>
-            <a:r>
-              <a:rPr lang="en-CA" dirty="0"/>
-              <a:t>, Yu, </a:t>
-            </a:r>
-            <a:r>
-              <a:rPr lang="en-CA" dirty="0" err="1"/>
-              <a:t>Jingyuan</a:t>
-            </a:r>
-            <a:r>
-              <a:rPr lang="en-CA" dirty="0"/>
-              <a:t>, Liu, </a:t>
-            </a:r>
-            <a:r>
-              <a:rPr lang="en-CA" dirty="0" err="1"/>
-              <a:t>Tuo</a:t>
-            </a:r>
-            <a:r>
-              <a:rPr lang="en-CA" dirty="0"/>
-              <a:t>, Ding, </a:t>
-            </a:r>
-            <a:r>
-              <a:rPr lang="en-CA" dirty="0" err="1"/>
-              <a:t>Yuning</a:t>
-            </a:r>
-            <a:r>
-              <a:rPr lang="en-CA" dirty="0"/>
-              <a:t>, … </a:t>
-            </a:r>
-            <a:r>
-              <a:rPr lang="en-CA" dirty="0" err="1"/>
-              <a:t>Chowell</a:t>
-            </a:r>
-            <a:r>
-              <a:rPr lang="en-CA" dirty="0"/>
-              <a:t>, Gerardo. (2020). "A large-scale COVID-19 Twitter chatter dataset for open scientific research - an international collaboration (Version 13.0) [Data set]". </a:t>
-            </a:r>
-            <a:r>
-              <a:rPr lang="en-CA" dirty="0" err="1"/>
-              <a:t>Zenodo</a:t>
-            </a:r>
-            <a:r>
-              <a:rPr lang="en-CA" dirty="0"/>
-              <a:t>. </a:t>
-            </a:r>
-            <a:r>
-              <a:rPr lang="en-CA" dirty="0">
-                <a:hlinkClick r:id="rId3"/>
-              </a:rPr>
-              <a:t>http://doi.org/10.5281/zenodo.3884334</a:t>
-            </a:r>
-            <a:r>
-              <a:rPr lang="en-CA" dirty="0"/>
-              <a:t>. Accessed Jun. 13, 2020.</a:t>
-            </a:r>
-          </a:p>
-          <a:p>
-            <a:r>
-              <a:rPr lang="en-US" dirty="0"/>
-              <a:t>[3] “Download today’s data on the geographic distribution of COVID-19 cases worldwide.” European Centre for Disease Prevention and Control, </a:t>
-            </a:r>
-            <a:r>
-              <a:rPr lang="en-US" dirty="0">
-                <a:hlinkClick r:id="rId4"/>
-              </a:rPr>
-              <a:t>https://www.ecdc.europa.eu/en/publications-data/download-todays-data-geographic-distribution-covid-19-cases-worldwide</a:t>
-            </a:r>
-            <a:r>
-              <a:rPr lang="en-US" dirty="0"/>
-              <a:t>. Accessed Jun. 13, 2020.</a:t>
-            </a:r>
-          </a:p>
-          <a:p>
-            <a:r>
-              <a:rPr lang="en-US" dirty="0"/>
-              <a:t>[4] Ritchie, Hannah. “Coronavirus Source Data.” Our World in Data, ourworldindata.org/coronavirus-source-data. Accessed Jun. 14, 2020.</a:t>
-            </a:r>
-          </a:p>
-          <a:p>
-            <a:r>
-              <a:rPr lang="en-CA" dirty="0"/>
-              <a:t>[5] </a:t>
-            </a:r>
-            <a:r>
-              <a:rPr lang="en-US" dirty="0"/>
-              <a:t>“Coronavirus disease (COVID-19) pandemic.” World Health Organization, </a:t>
-            </a:r>
-            <a:r>
-              <a:rPr lang="en-CA" dirty="0">
-                <a:solidFill>
-                  <a:srgbClr val="0066FF"/>
-                </a:solidFill>
-                <a:hlinkClick r:id="rId5">
-                  <a:extLst>
-                    <a:ext uri="{A12FA001-AC4F-418D-AE19-62706E023703}">
-                      <ahyp:hlinkClr xmlns:ahyp="http://schemas.microsoft.com/office/drawing/2018/hyperlinkcolor" val="tx"/>
-                    </a:ext>
-                  </a:extLst>
-                </a:hlinkClick>
-              </a:rPr>
-              <a:t>https://www.who.int/emergencies/diseases/novel-coronavirus-2019</a:t>
-            </a:r>
-            <a:r>
-              <a:rPr lang="en-CA" dirty="0"/>
-              <a:t>. Accessed Jun. 14, 2020</a:t>
-            </a:r>
-          </a:p>
-        </p:txBody>
-      </p:sp>
-      <p:sp>
-        <p:nvSpPr>
-          <p:cNvPr id="4" name="Slide Number Placeholder 3">
-            <a:extLst>
-              <a:ext uri="{FF2B5EF4-FFF2-40B4-BE49-F238E27FC236}">
-                <a16:creationId xmlns:a16="http://schemas.microsoft.com/office/drawing/2014/main" id="{6A3AE607-CE8B-4CDD-B8D1-3FA38DB84C20}"/>
-              </a:ext>
-            </a:extLst>
-          </p:cNvPr>
-          <p:cNvSpPr>
-            <a:spLocks noGrp="1"/>
-          </p:cNvSpPr>
-          <p:nvPr>
-            <p:ph type="sldNum" sz="quarter" idx="12"/>
-          </p:nvPr>
-        </p:nvSpPr>
-        <p:spPr/>
-        <p:txBody>
-          <a:bodyPr/>
-          <a:lstStyle/>
-          <a:p>
-            <a:fld id="{DBA1B0FB-D917-4C8C-928F-313BD683BF39}" type="slidenum">
-              <a:rPr lang="en-US" smtClean="0"/>
-              <a:t>5</a:t>
-            </a:fld>
-            <a:endParaRPr lang="en-US"/>
-          </a:p>
-        </p:txBody>
-      </p:sp>
-    </p:spTree>
-    <p:extLst>
-      <p:ext uri="{BB962C8B-B14F-4D97-AF65-F5344CB8AC3E}">
-        <p14:creationId xmlns:p14="http://schemas.microsoft.com/office/powerpoint/2010/main" val="2992931103"/>
-      </p:ext>
-    </p:extLst>
-  </p:cSld>
-  <p:clrMapOvr>
-    <a:masterClrMapping/>
-  </p:clrMapOvr>
-</p:sld>
-</file>
-
-<file path=ppt/slides/slide6.xml><?xml version="1.0" encoding="utf-8"?>
-<p:sld xmlns:a="http://schemas.openxmlformats.org/drawingml/2006/main" xmlns:r="http://schemas.openxmlformats.org/officeDocument/2006/relationships" xmlns:p="http://schemas.openxmlformats.org/presentationml/2006/main">
-  <p:cSld>
     <p:bg>
       <p:bgPr>
         <a:solidFill>
@@ -10903,7 +10632,7 @@
                   <a:spcPts val="600"/>
                 </a:spcAft>
               </a:pPr>
-              <a:t>6</a:t>
+              <a:t>5</a:t>
             </a:fld>
             <a:endParaRPr lang="en-US"/>
           </a:p>
@@ -10913,6 +10642,277 @@
     <p:extLst>
       <p:ext uri="{BB962C8B-B14F-4D97-AF65-F5344CB8AC3E}">
         <p14:creationId xmlns:p14="http://schemas.microsoft.com/office/powerpoint/2010/main" val="1834095312"/>
+      </p:ext>
+    </p:extLst>
+  </p:cSld>
+  <p:clrMapOvr>
+    <a:masterClrMapping/>
+  </p:clrMapOvr>
+</p:sld>
+</file>
+
+<file path=ppt/slides/slide6.xml><?xml version="1.0" encoding="utf-8"?>
+<p:sld xmlns:a="http://schemas.openxmlformats.org/drawingml/2006/main" xmlns:r="http://schemas.openxmlformats.org/officeDocument/2006/relationships" xmlns:p="http://schemas.openxmlformats.org/presentationml/2006/main">
+  <p:cSld>
+    <p:spTree>
+      <p:nvGrpSpPr>
+        <p:cNvPr id="1" name=""/>
+        <p:cNvGrpSpPr/>
+        <p:nvPr/>
+      </p:nvGrpSpPr>
+      <p:grpSpPr>
+        <a:xfrm>
+          <a:off x="0" y="0"/>
+          <a:ext cx="0" cy="0"/>
+          <a:chOff x="0" y="0"/>
+          <a:chExt cx="0" cy="0"/>
+        </a:xfrm>
+      </p:grpSpPr>
+      <p:sp>
+        <p:nvSpPr>
+          <p:cNvPr id="2" name="Title 1">
+            <a:extLst>
+              <a:ext uri="{FF2B5EF4-FFF2-40B4-BE49-F238E27FC236}">
+                <a16:creationId xmlns:a16="http://schemas.microsoft.com/office/drawing/2014/main" id="{EFC8D769-35B7-4E82-A5B1-7C2C646912B5}"/>
+              </a:ext>
+            </a:extLst>
+          </p:cNvPr>
+          <p:cNvSpPr>
+            <a:spLocks noGrp="1"/>
+          </p:cNvSpPr>
+          <p:nvPr>
+            <p:ph type="title"/>
+          </p:nvPr>
+        </p:nvSpPr>
+        <p:spPr/>
+        <p:txBody>
+          <a:bodyPr/>
+          <a:lstStyle/>
+          <a:p>
+            <a:r>
+              <a:rPr lang="en-CA" dirty="0"/>
+              <a:t>References</a:t>
+            </a:r>
+          </a:p>
+        </p:txBody>
+      </p:sp>
+      <p:sp>
+        <p:nvSpPr>
+          <p:cNvPr id="3" name="Content Placeholder 2">
+            <a:extLst>
+              <a:ext uri="{FF2B5EF4-FFF2-40B4-BE49-F238E27FC236}">
+                <a16:creationId xmlns:a16="http://schemas.microsoft.com/office/drawing/2014/main" id="{80825841-B114-4D00-BA2F-99DCE12ED734}"/>
+              </a:ext>
+            </a:extLst>
+          </p:cNvPr>
+          <p:cNvSpPr>
+            <a:spLocks noGrp="1"/>
+          </p:cNvSpPr>
+          <p:nvPr>
+            <p:ph idx="1"/>
+          </p:nvPr>
+        </p:nvSpPr>
+        <p:spPr>
+          <a:xfrm>
+            <a:off x="550862" y="1754981"/>
+            <a:ext cx="11336337" cy="4061358"/>
+          </a:xfrm>
+        </p:spPr>
+        <p:txBody>
+          <a:bodyPr>
+            <a:normAutofit fontScale="77500" lnSpcReduction="20000"/>
+          </a:bodyPr>
+          <a:lstStyle/>
+          <a:p>
+            <a:r>
+              <a:rPr lang="en-CA" dirty="0"/>
+              <a:t>[1] Rabindra </a:t>
+            </a:r>
+            <a:r>
+              <a:rPr lang="en-CA" dirty="0" err="1"/>
+              <a:t>Lamsal</a:t>
+            </a:r>
+            <a:r>
+              <a:rPr lang="en-CA" dirty="0"/>
+              <a:t>. "Coronavirus (COVID-19) Tweets Dataset". IEEE </a:t>
+            </a:r>
+            <a:r>
+              <a:rPr lang="en-CA" dirty="0" err="1"/>
+              <a:t>Dataport</a:t>
+            </a:r>
+            <a:r>
+              <a:rPr lang="en-CA" dirty="0"/>
+              <a:t>, 2020. [Online]. Available: </a:t>
+            </a:r>
+            <a:r>
+              <a:rPr lang="en-CA" dirty="0">
+                <a:hlinkClick r:id="rId2"/>
+              </a:rPr>
+              <a:t>http://dx.doi.org/10.21227/781w-ef42</a:t>
+            </a:r>
+            <a:r>
+              <a:rPr lang="en-CA" dirty="0"/>
+              <a:t>. Accessed: Jun. 05, 2020.</a:t>
+            </a:r>
+          </a:p>
+          <a:p>
+            <a:r>
+              <a:rPr lang="en-CA" dirty="0"/>
+              <a:t>[2] Banda, Juan M., </a:t>
+            </a:r>
+            <a:r>
+              <a:rPr lang="en-CA" dirty="0" err="1"/>
+              <a:t>Tekumalla</a:t>
+            </a:r>
+            <a:r>
+              <a:rPr lang="en-CA" dirty="0"/>
+              <a:t>, Ramya, Wang, </a:t>
+            </a:r>
+            <a:r>
+              <a:rPr lang="en-CA" dirty="0" err="1"/>
+              <a:t>Guanyu</a:t>
+            </a:r>
+            <a:r>
+              <a:rPr lang="en-CA" dirty="0"/>
+              <a:t>, Yu, </a:t>
+            </a:r>
+            <a:r>
+              <a:rPr lang="en-CA" dirty="0" err="1"/>
+              <a:t>Jingyuan</a:t>
+            </a:r>
+            <a:r>
+              <a:rPr lang="en-CA" dirty="0"/>
+              <a:t>, Liu, </a:t>
+            </a:r>
+            <a:r>
+              <a:rPr lang="en-CA" dirty="0" err="1"/>
+              <a:t>Tuo</a:t>
+            </a:r>
+            <a:r>
+              <a:rPr lang="en-CA" dirty="0"/>
+              <a:t>, Ding, </a:t>
+            </a:r>
+            <a:r>
+              <a:rPr lang="en-CA" dirty="0" err="1"/>
+              <a:t>Yuning</a:t>
+            </a:r>
+            <a:r>
+              <a:rPr lang="en-CA" dirty="0"/>
+              <a:t>, … </a:t>
+            </a:r>
+            <a:r>
+              <a:rPr lang="en-CA" dirty="0" err="1"/>
+              <a:t>Chowell</a:t>
+            </a:r>
+            <a:r>
+              <a:rPr lang="en-CA" dirty="0"/>
+              <a:t>, Gerardo. (2020). "A large-scale COVID-19 Twitter chatter dataset for open scientific research - an international collaboration (Version 13.0) [Data set]". </a:t>
+            </a:r>
+            <a:r>
+              <a:rPr lang="en-CA" dirty="0" err="1"/>
+              <a:t>Zenodo</a:t>
+            </a:r>
+            <a:r>
+              <a:rPr lang="en-CA" dirty="0"/>
+              <a:t>. </a:t>
+            </a:r>
+            <a:r>
+              <a:rPr lang="en-CA" dirty="0">
+                <a:hlinkClick r:id="rId3"/>
+              </a:rPr>
+              <a:t>http://doi.org/10.5281/zenodo.3884334</a:t>
+            </a:r>
+            <a:r>
+              <a:rPr lang="en-CA" dirty="0"/>
+              <a:t>. Accessed Jun. 13, 2020.</a:t>
+            </a:r>
+          </a:p>
+          <a:p>
+            <a:r>
+              <a:rPr lang="en-US" dirty="0"/>
+              <a:t>[3] “Download today’s data on the geographic distribution of COVID-19 cases worldwide.” European Centre for Disease Prevention and Control, </a:t>
+            </a:r>
+            <a:r>
+              <a:rPr lang="en-US" dirty="0">
+                <a:hlinkClick r:id="rId4"/>
+              </a:rPr>
+              <a:t>https://www.ecdc.europa.eu/en/publications-data/download-todays-data-geographic-distribution-covid-19-cases-worldwide</a:t>
+            </a:r>
+            <a:r>
+              <a:rPr lang="en-US" dirty="0"/>
+              <a:t>. Accessed Jun. 13, 2020.</a:t>
+            </a:r>
+          </a:p>
+          <a:p>
+            <a:r>
+              <a:rPr lang="en-US" dirty="0"/>
+              <a:t>[4] Ritchie, Hannah. “Coronavirus Source Data.” Our World in Data, ourworldindata.org/coronavirus-source-data. Accessed Jun. 14, 2020.</a:t>
+            </a:r>
+          </a:p>
+          <a:p>
+            <a:r>
+              <a:rPr lang="en-CA" dirty="0"/>
+              <a:t>[5] </a:t>
+            </a:r>
+            <a:r>
+              <a:rPr lang="en-US" dirty="0"/>
+              <a:t>“Coronavirus disease (COVID-19) pandemic.” World Health Organization, </a:t>
+            </a:r>
+            <a:r>
+              <a:rPr lang="en-CA" dirty="0">
+                <a:solidFill>
+                  <a:srgbClr val="0066FF"/>
+                </a:solidFill>
+                <a:hlinkClick r:id="rId5">
+                  <a:extLst>
+                    <a:ext uri="{A12FA001-AC4F-418D-AE19-62706E023703}">
+                      <ahyp:hlinkClr xmlns:ahyp="http://schemas.microsoft.com/office/drawing/2018/hyperlinkcolor" val="tx"/>
+                    </a:ext>
+                  </a:extLst>
+                </a:hlinkClick>
+              </a:rPr>
+              <a:t>https://www.who.int/emergencies/diseases/novel-coronavirus-2019</a:t>
+            </a:r>
+            <a:r>
+              <a:rPr lang="en-CA" dirty="0"/>
+              <a:t>. Accessed Jun. 14, 2020</a:t>
+            </a:r>
+          </a:p>
+        </p:txBody>
+      </p:sp>
+      <p:sp>
+        <p:nvSpPr>
+          <p:cNvPr id="4" name="Slide Number Placeholder 3">
+            <a:extLst>
+              <a:ext uri="{FF2B5EF4-FFF2-40B4-BE49-F238E27FC236}">
+                <a16:creationId xmlns:a16="http://schemas.microsoft.com/office/drawing/2014/main" id="{6A3AE607-CE8B-4CDD-B8D1-3FA38DB84C20}"/>
+              </a:ext>
+            </a:extLst>
+          </p:cNvPr>
+          <p:cNvSpPr>
+            <a:spLocks noGrp="1"/>
+          </p:cNvSpPr>
+          <p:nvPr>
+            <p:ph type="sldNum" sz="quarter" idx="12"/>
+          </p:nvPr>
+        </p:nvSpPr>
+        <p:spPr/>
+        <p:txBody>
+          <a:bodyPr/>
+          <a:lstStyle/>
+          <a:p>
+            <a:fld id="{DBA1B0FB-D917-4C8C-928F-313BD683BF39}" type="slidenum">
+              <a:rPr lang="en-US" smtClean="0"/>
+              <a:t>6</a:t>
+            </a:fld>
+            <a:endParaRPr lang="en-US"/>
+          </a:p>
+        </p:txBody>
+      </p:sp>
+    </p:spTree>
+    <p:extLst>
+      <p:ext uri="{BB962C8B-B14F-4D97-AF65-F5344CB8AC3E}">
+        <p14:creationId xmlns:p14="http://schemas.microsoft.com/office/powerpoint/2010/main" val="2992931103"/>
       </p:ext>
     </p:extLst>
   </p:cSld>

</xml_diff>